<commit_message>
Version 15 Junio 2020
Versión de los archivos del 15 de junio 2020
</commit_message>
<xml_diff>
--- a/2020/cursos/geometria/sexto/Clase virtual Espera Geometría 6-1.pptx
+++ b/2020/cursos/geometria/sexto/Clase virtual Espera Geometría 6-1.pptx
@@ -215,7 +215,7 @@
           <a:p>
             <a:fld id="{34AA17DB-72A2-43D6-BF69-A136FC65D779}" type="datetime1">
               <a:rPr lang="es-ES" smtClean="0"/>
-              <a:t>29/05/2020</a:t>
+              <a:t>12/06/2020</a:t>
             </a:fld>
             <a:endParaRPr lang="es-ES"/>
           </a:p>
@@ -395,7 +395,7 @@
             <a:pPr rtl="0"/>
             <a:fld id="{6CC543DD-464E-4673-A57A-E618FCDF50CF}" type="datetime1">
               <a:rPr lang="es-ES" noProof="0" smtClean="0"/>
-              <a:t>29/05/2020</a:t>
+              <a:t>12/06/2020</a:t>
             </a:fld>
             <a:endParaRPr lang="es-ES" noProof="0"/>
           </a:p>
@@ -954,7 +954,7 @@
             <a:pPr rtl="0"/>
             <a:fld id="{2D8BE151-2248-4821-842E-7322E4A6D57F}" type="datetime1">
               <a:rPr lang="es-ES" noProof="0" smtClean="0"/>
-              <a:t>29/05/2020</a:t>
+              <a:t>12/06/2020</a:t>
             </a:fld>
             <a:endParaRPr lang="es-ES" noProof="0"/>
           </a:p>
@@ -1249,7 +1249,7 @@
             <a:pPr rtl="0"/>
             <a:fld id="{B8444487-007C-40A4-9F60-6A6E73573E7F}" type="datetime1">
               <a:rPr lang="es-ES" noProof="0" smtClean="0"/>
-              <a:t>29/05/2020</a:t>
+              <a:t>12/06/2020</a:t>
             </a:fld>
             <a:endParaRPr lang="es-ES" noProof="0"/>
           </a:p>
@@ -1501,7 +1501,7 @@
             <a:pPr rtl="0"/>
             <a:fld id="{84520280-06E2-43C5-88DD-12726B6572FB}" type="datetime1">
               <a:rPr lang="es-ES" noProof="0" smtClean="0"/>
-              <a:t>29/05/2020</a:t>
+              <a:t>12/06/2020</a:t>
             </a:fld>
             <a:endParaRPr lang="es-ES" noProof="0"/>
           </a:p>
@@ -2041,7 +2041,7 @@
             <a:pPr rtl="0"/>
             <a:fld id="{0C664840-1829-469B-BE30-8D5ACDC84DF3}" type="datetime1">
               <a:rPr lang="es-ES" noProof="0" smtClean="0"/>
-              <a:t>29/05/2020</a:t>
+              <a:t>12/06/2020</a:t>
             </a:fld>
             <a:endParaRPr lang="es-ES" noProof="0"/>
           </a:p>
@@ -2293,7 +2293,7 @@
             <a:pPr rtl="0"/>
             <a:fld id="{3E924D5A-D756-413B-AC7D-79AFAE11178F}" type="datetime1">
               <a:rPr lang="es-ES" noProof="0" smtClean="0"/>
-              <a:t>29/05/2020</a:t>
+              <a:t>12/06/2020</a:t>
             </a:fld>
             <a:endParaRPr lang="es-ES" noProof="0"/>
           </a:p>
@@ -2840,7 +2840,7 @@
             <a:pPr rtl="0"/>
             <a:fld id="{AB47BC79-2BF0-42F0-8EC7-4E30758276A0}" type="datetime1">
               <a:rPr lang="es-ES" noProof="0" smtClean="0"/>
-              <a:t>29/05/2020</a:t>
+              <a:t>12/06/2020</a:t>
             </a:fld>
             <a:endParaRPr lang="es-ES" noProof="0"/>
           </a:p>
@@ -3153,7 +3153,7 @@
             <a:pPr rtl="0"/>
             <a:fld id="{99E3D2F5-1ADA-44D4-8E12-071F68BE1FE8}" type="datetime1">
               <a:rPr lang="es-ES" noProof="0" smtClean="0"/>
-              <a:t>29/05/2020</a:t>
+              <a:t>12/06/2020</a:t>
             </a:fld>
             <a:endParaRPr lang="es-ES" noProof="0"/>
           </a:p>
@@ -3335,7 +3335,7 @@
             <a:pPr rtl="0"/>
             <a:fld id="{B4CB7895-2F71-41F2-B822-59864C66BC54}" type="datetime1">
               <a:rPr lang="es-ES" noProof="0" smtClean="0"/>
-              <a:t>29/05/2020</a:t>
+              <a:t>12/06/2020</a:t>
             </a:fld>
             <a:endParaRPr lang="es-ES" noProof="0"/>
           </a:p>
@@ -3522,7 +3522,7 @@
             <a:pPr rtl="0"/>
             <a:fld id="{A84E41B1-6677-44CA-AF50-35FA1F499DD5}" type="datetime1">
               <a:rPr lang="es-ES" noProof="0" smtClean="0"/>
-              <a:t>29/05/2020</a:t>
+              <a:t>12/06/2020</a:t>
             </a:fld>
             <a:endParaRPr lang="es-ES" noProof="0"/>
           </a:p>
@@ -3699,7 +3699,7 @@
             <a:pPr rtl="0"/>
             <a:fld id="{FEA57546-CB8A-4887-A51A-6AFB94E74D9C}" type="datetime1">
               <a:rPr lang="es-ES" noProof="0" smtClean="0"/>
-              <a:t>29/05/2020</a:t>
+              <a:t>12/06/2020</a:t>
             </a:fld>
             <a:endParaRPr lang="es-ES" noProof="0"/>
           </a:p>
@@ -3949,7 +3949,7 @@
             <a:pPr rtl="0"/>
             <a:fld id="{5BC374BA-6EDA-4321-9221-D60BD18F7FDC}" type="datetime1">
               <a:rPr lang="es-ES" noProof="0" smtClean="0"/>
-              <a:t>29/05/2020</a:t>
+              <a:t>12/06/2020</a:t>
             </a:fld>
             <a:endParaRPr lang="es-ES" noProof="0"/>
           </a:p>
@@ -4243,7 +4243,7 @@
             <a:pPr rtl="0"/>
             <a:fld id="{BCD2E1C0-EF79-4422-82D2-15C9FCDFB66B}" type="datetime1">
               <a:rPr lang="es-ES" noProof="0" smtClean="0"/>
-              <a:t>29/05/2020</a:t>
+              <a:t>12/06/2020</a:t>
             </a:fld>
             <a:endParaRPr lang="es-ES" noProof="0"/>
           </a:p>
@@ -4675,7 +4675,7 @@
             <a:pPr rtl="0"/>
             <a:fld id="{278A6CE7-1B28-44C9-A58F-36EC48EEF0AD}" type="datetime1">
               <a:rPr lang="es-ES" noProof="0" smtClean="0"/>
-              <a:t>29/05/2020</a:t>
+              <a:t>12/06/2020</a:t>
             </a:fld>
             <a:endParaRPr lang="es-ES" noProof="0"/>
           </a:p>
@@ -4802,7 +4802,7 @@
             <a:pPr rtl="0"/>
             <a:fld id="{6AD34CAD-0E79-4C2F-B6C6-329371A1AB6F}" type="datetime1">
               <a:rPr lang="es-ES" noProof="0" smtClean="0"/>
-              <a:t>29/05/2020</a:t>
+              <a:t>12/06/2020</a:t>
             </a:fld>
             <a:endParaRPr lang="es-ES" noProof="0"/>
           </a:p>
@@ -4901,7 +4901,7 @@
             <a:pPr rtl="0"/>
             <a:fld id="{4BE872A2-DECC-470E-91E8-E96B09B12F5C}" type="datetime1">
               <a:rPr lang="es-ES" noProof="0" smtClean="0"/>
-              <a:t>29/05/2020</a:t>
+              <a:t>12/06/2020</a:t>
             </a:fld>
             <a:endParaRPr lang="es-ES" noProof="0"/>
           </a:p>
@@ -5187,7 +5187,7 @@
             <a:pPr rtl="0"/>
             <a:fld id="{716F8101-C3C2-4D37-BA1D-F3C026736CBF}" type="datetime1">
               <a:rPr lang="es-ES" noProof="0" smtClean="0"/>
-              <a:t>29/05/2020</a:t>
+              <a:t>12/06/2020</a:t>
             </a:fld>
             <a:endParaRPr lang="es-ES" noProof="0"/>
           </a:p>
@@ -5482,7 +5482,7 @@
             <a:pPr rtl="0"/>
             <a:fld id="{D7FD6B96-577D-4D35-AD52-F1B24D45EF82}" type="datetime1">
               <a:rPr lang="es-ES" noProof="0" smtClean="0"/>
-              <a:t>29/05/2020</a:t>
+              <a:t>12/06/2020</a:t>
             </a:fld>
             <a:endParaRPr lang="es-ES" noProof="0"/>
           </a:p>
@@ -5716,7 +5716,7 @@
             <a:pPr rtl="0"/>
             <a:fld id="{DA5A5905-E371-4D31-8BE9-D5B391D94305}" type="datetime1">
               <a:rPr lang="es-ES" noProof="0" smtClean="0"/>
-              <a:t>29/05/2020</a:t>
+              <a:t>12/06/2020</a:t>
             </a:fld>
             <a:endParaRPr lang="es-ES" noProof="0"/>
           </a:p>
@@ -6502,7 +6502,7 @@
                   <a:srgbClr val="FFFF00"/>
                 </a:solidFill>
               </a:rPr>
-              <a:t>Arrancamos a las 11:05 am</a:t>
+              <a:t>Arrancamos a las 10:05 am</a:t>
             </a:r>
             <a:endParaRPr lang="es-ES" sz="11700" b="1" dirty="0">
               <a:solidFill>
@@ -7372,12 +7372,11 @@
 </file>
 
 <file path=customXml/item1.xml><?xml version="1.0" encoding="utf-8"?>
-<?mso-contentType ?>
-<FormTemplates xmlns="http://schemas.microsoft.com/sharepoint/v3/contenttype/forms">
-  <Display>DocumentLibraryForm</Display>
-  <Edit>DocumentLibraryForm</Edit>
-  <New>DocumentLibraryForm</New>
-</FormTemplates>
+<p:properties xmlns:p="http://schemas.microsoft.com/office/2006/metadata/properties" xmlns:xsi="http://www.w3.org/2001/XMLSchema-instance" xmlns:pc="http://schemas.microsoft.com/office/infopath/2007/PartnerControls">
+  <documentManagement>
+    <MediaServiceKeyPoints xmlns="71af3243-3dd4-4a8d-8c0d-dd76da1f02a5" xsi:nil="true"/>
+  </documentManagement>
+</p:properties>
 </file>
 
 <file path=customXml/item2.xml><?xml version="1.0" encoding="utf-8"?>
@@ -7592,17 +7591,20 @@
 </file>
 
 <file path=customXml/item3.xml><?xml version="1.0" encoding="utf-8"?>
-<p:properties xmlns:p="http://schemas.microsoft.com/office/2006/metadata/properties" xmlns:xsi="http://www.w3.org/2001/XMLSchema-instance" xmlns:pc="http://schemas.microsoft.com/office/infopath/2007/PartnerControls">
-  <documentManagement>
-    <MediaServiceKeyPoints xmlns="71af3243-3dd4-4a8d-8c0d-dd76da1f02a5" xsi:nil="true"/>
-  </documentManagement>
-</p:properties>
+<?mso-contentType ?>
+<FormTemplates xmlns="http://schemas.microsoft.com/sharepoint/v3/contenttype/forms">
+  <Display>DocumentLibraryForm</Display>
+  <Edit>DocumentLibraryForm</Edit>
+  <New>DocumentLibraryForm</New>
+</FormTemplates>
 </file>
 
 <file path=customXml/itemProps1.xml><?xml version="1.0" encoding="utf-8"?>
-<ds:datastoreItem xmlns:ds="http://schemas.openxmlformats.org/officeDocument/2006/customXml" ds:itemID="{07235EAC-5FEE-4CF4-B627-4AC327BD042D}">
+<ds:datastoreItem xmlns:ds="http://schemas.openxmlformats.org/officeDocument/2006/customXml" ds:itemID="{DBA0466F-55BA-4B4C-B910-3BFE9417EB92}">
   <ds:schemaRefs>
-    <ds:schemaRef ds:uri="http://schemas.microsoft.com/sharepoint/v3/contenttype/forms"/>
+    <ds:schemaRef ds:uri="http://schemas.microsoft.com/office/2006/metadata/properties"/>
+    <ds:schemaRef ds:uri="http://schemas.microsoft.com/office/infopath/2007/PartnerControls"/>
+    <ds:schemaRef ds:uri="71af3243-3dd4-4a8d-8c0d-dd76da1f02a5"/>
   </ds:schemaRefs>
 </ds:datastoreItem>
 </file>
@@ -7627,11 +7629,9 @@
 </file>
 
 <file path=customXml/itemProps3.xml><?xml version="1.0" encoding="utf-8"?>
-<ds:datastoreItem xmlns:ds="http://schemas.openxmlformats.org/officeDocument/2006/customXml" ds:itemID="{DBA0466F-55BA-4B4C-B910-3BFE9417EB92}">
+<ds:datastoreItem xmlns:ds="http://schemas.openxmlformats.org/officeDocument/2006/customXml" ds:itemID="{07235EAC-5FEE-4CF4-B627-4AC327BD042D}">
   <ds:schemaRefs>
-    <ds:schemaRef ds:uri="http://schemas.microsoft.com/office/2006/metadata/properties"/>
-    <ds:schemaRef ds:uri="http://schemas.microsoft.com/office/infopath/2007/PartnerControls"/>
-    <ds:schemaRef ds:uri="71af3243-3dd4-4a8d-8c0d-dd76da1f02a5"/>
+    <ds:schemaRef ds:uri="http://schemas.microsoft.com/sharepoint/v3/contenttype/forms"/>
   </ds:schemaRefs>
 </ds:datastoreItem>
 </file>
</xml_diff>